<commit_message>
update the function to show the persudo color map of the reflectance
</commit_message>
<xml_diff>
--- a/Documents/HS.pptx
+++ b/Documents/HS.pptx
@@ -287,7 +287,7 @@
           <a:p>
             <a:fld id="{F649FDD9-2C4F-4C1E-958B-8F1028AF7DAC}" type="datetimeFigureOut">
               <a:rPr lang="zh-CN" altLang="en-US" smtClean="0"/>
-              <a:t>2023/6/29</a:t>
+              <a:t>2023/7/14</a:t>
             </a:fld>
             <a:endParaRPr lang="zh-CN" altLang="en-US"/>
           </a:p>
@@ -485,7 +485,7 @@
           <a:p>
             <a:fld id="{F649FDD9-2C4F-4C1E-958B-8F1028AF7DAC}" type="datetimeFigureOut">
               <a:rPr lang="zh-CN" altLang="en-US" smtClean="0"/>
-              <a:t>2023/6/29</a:t>
+              <a:t>2023/7/14</a:t>
             </a:fld>
             <a:endParaRPr lang="zh-CN" altLang="en-US"/>
           </a:p>
@@ -693,7 +693,7 @@
           <a:p>
             <a:fld id="{F649FDD9-2C4F-4C1E-958B-8F1028AF7DAC}" type="datetimeFigureOut">
               <a:rPr lang="zh-CN" altLang="en-US" smtClean="0"/>
-              <a:t>2023/6/29</a:t>
+              <a:t>2023/7/14</a:t>
             </a:fld>
             <a:endParaRPr lang="zh-CN" altLang="en-US"/>
           </a:p>
@@ -800,7 +800,7 @@
           <a:p>
             <a:fld id="{D452ECAD-9D28-4DFE-BB88-DE41F9707759}" type="datetimeFigureOut">
               <a:rPr lang="zh-CN" altLang="en-US" smtClean="0"/>
-              <a:t>2023/6/29</a:t>
+              <a:t>2023/7/14</a:t>
             </a:fld>
             <a:endParaRPr lang="zh-CN" altLang="en-US"/>
           </a:p>
@@ -1066,7 +1066,7 @@
           <a:p>
             <a:fld id="{F649FDD9-2C4F-4C1E-958B-8F1028AF7DAC}" type="datetimeFigureOut">
               <a:rPr lang="zh-CN" altLang="en-US" smtClean="0"/>
-              <a:t>2023/6/29</a:t>
+              <a:t>2023/7/14</a:t>
             </a:fld>
             <a:endParaRPr lang="zh-CN" altLang="en-US"/>
           </a:p>
@@ -1341,7 +1341,7 @@
           <a:p>
             <a:fld id="{F649FDD9-2C4F-4C1E-958B-8F1028AF7DAC}" type="datetimeFigureOut">
               <a:rPr lang="zh-CN" altLang="en-US" smtClean="0"/>
-              <a:t>2023/6/29</a:t>
+              <a:t>2023/7/14</a:t>
             </a:fld>
             <a:endParaRPr lang="zh-CN" altLang="en-US"/>
           </a:p>
@@ -1606,7 +1606,7 @@
           <a:p>
             <a:fld id="{F649FDD9-2C4F-4C1E-958B-8F1028AF7DAC}" type="datetimeFigureOut">
               <a:rPr lang="zh-CN" altLang="en-US" smtClean="0"/>
-              <a:t>2023/6/29</a:t>
+              <a:t>2023/7/14</a:t>
             </a:fld>
             <a:endParaRPr lang="zh-CN" altLang="en-US"/>
           </a:p>
@@ -2018,7 +2018,7 @@
           <a:p>
             <a:fld id="{F649FDD9-2C4F-4C1E-958B-8F1028AF7DAC}" type="datetimeFigureOut">
               <a:rPr lang="zh-CN" altLang="en-US" smtClean="0"/>
-              <a:t>2023/6/29</a:t>
+              <a:t>2023/7/14</a:t>
             </a:fld>
             <a:endParaRPr lang="zh-CN" altLang="en-US"/>
           </a:p>
@@ -2159,7 +2159,7 @@
           <a:p>
             <a:fld id="{F649FDD9-2C4F-4C1E-958B-8F1028AF7DAC}" type="datetimeFigureOut">
               <a:rPr lang="zh-CN" altLang="en-US" smtClean="0"/>
-              <a:t>2023/6/29</a:t>
+              <a:t>2023/7/14</a:t>
             </a:fld>
             <a:endParaRPr lang="zh-CN" altLang="en-US"/>
           </a:p>
@@ -2272,7 +2272,7 @@
           <a:p>
             <a:fld id="{F649FDD9-2C4F-4C1E-958B-8F1028AF7DAC}" type="datetimeFigureOut">
               <a:rPr lang="zh-CN" altLang="en-US" smtClean="0"/>
-              <a:t>2023/6/29</a:t>
+              <a:t>2023/7/14</a:t>
             </a:fld>
             <a:endParaRPr lang="zh-CN" altLang="en-US"/>
           </a:p>
@@ -2583,7 +2583,7 @@
           <a:p>
             <a:fld id="{F649FDD9-2C4F-4C1E-958B-8F1028AF7DAC}" type="datetimeFigureOut">
               <a:rPr lang="zh-CN" altLang="en-US" smtClean="0"/>
-              <a:t>2023/6/29</a:t>
+              <a:t>2023/7/14</a:t>
             </a:fld>
             <a:endParaRPr lang="zh-CN" altLang="en-US"/>
           </a:p>
@@ -2871,7 +2871,7 @@
           <a:p>
             <a:fld id="{F649FDD9-2C4F-4C1E-958B-8F1028AF7DAC}" type="datetimeFigureOut">
               <a:rPr lang="zh-CN" altLang="en-US" smtClean="0"/>
-              <a:t>2023/6/29</a:t>
+              <a:t>2023/7/14</a:t>
             </a:fld>
             <a:endParaRPr lang="zh-CN" altLang="en-US"/>
           </a:p>
@@ -3112,7 +3112,7 @@
           <a:p>
             <a:fld id="{F649FDD9-2C4F-4C1E-958B-8F1028AF7DAC}" type="datetimeFigureOut">
               <a:rPr lang="zh-CN" altLang="en-US" smtClean="0"/>
-              <a:t>2023/6/29</a:t>
+              <a:t>2023/7/14</a:t>
             </a:fld>
             <a:endParaRPr lang="zh-CN" altLang="en-US"/>
           </a:p>
@@ -3721,7 +3721,7 @@
                 <a:latin typeface="思源宋体 CN Heavy" panose="02020900000000000000" pitchFamily="18" charset="-122"/>
                 <a:ea typeface="思源宋体 CN Heavy" panose="02020900000000000000" pitchFamily="18" charset="-122"/>
               </a:rPr>
-              <a:t>数据处理</a:t>
+              <a:t>数据分析处理</a:t>
             </a:r>
             <a:r>
               <a:rPr lang="zh-CN" altLang="en-US" sz="3200" dirty="0">
@@ -7454,7 +7454,7 @@
         </p:nvSpPr>
         <p:spPr>
           <a:xfrm>
-            <a:off x="179539" y="3273355"/>
+            <a:off x="1111523" y="3819578"/>
             <a:ext cx="4285615" cy="585470"/>
           </a:xfrm>
           <a:prstGeom prst="round1Rect">
@@ -7631,7 +7631,7 @@
         </p:nvSpPr>
         <p:spPr>
           <a:xfrm>
-            <a:off x="179539" y="4347139"/>
+            <a:off x="1111523" y="4893362"/>
             <a:ext cx="4285615" cy="585470"/>
           </a:xfrm>
           <a:prstGeom prst="round1Rect">
@@ -7679,7 +7679,7 @@
                 <a:cs typeface="思源黑体 CN Regular" panose="020B0500000000000000" charset="-122"/>
                 <a:sym typeface="+mn-ea"/>
               </a:rPr>
-              <a:t>植物表型参数分析</a:t>
+              <a:t>光谱指数计算</a:t>
             </a:r>
             <a:endParaRPr lang="zh-CN" altLang="en-US" sz="2200" dirty="0">
               <a:solidFill>
@@ -7711,7 +7711,7 @@
         </p:nvSpPr>
         <p:spPr>
           <a:xfrm>
-            <a:off x="6109018" y="3283020"/>
+            <a:off x="7041002" y="3829243"/>
             <a:ext cx="4285615" cy="585470"/>
           </a:xfrm>
           <a:prstGeom prst="round1Rect">
@@ -7759,7 +7759,19 @@
                 <a:cs typeface="思源黑体 CN Regular" panose="020B0500000000000000" charset="-122"/>
                 <a:sym typeface="+mn-ea"/>
               </a:rPr>
-              <a:t>光谱指数分析</a:t>
+              <a:t>光谱</a:t>
+            </a:r>
+            <a:r>
+              <a:rPr lang="zh-CN" altLang="en-US" sz="2200" dirty="0" smtClean="0">
+                <a:solidFill>
+                  <a:schemeClr val="bg1"/>
+                </a:solidFill>
+                <a:latin typeface="思源黑体 CN Regular" panose="020B0500000000000000" charset="-122"/>
+                <a:ea typeface="思源黑体 CN Regular" panose="020B0500000000000000" charset="-122"/>
+                <a:cs typeface="思源黑体 CN Regular" panose="020B0500000000000000" charset="-122"/>
+                <a:sym typeface="+mn-ea"/>
+              </a:rPr>
+              <a:t>数据预处理</a:t>
             </a:r>
             <a:endParaRPr lang="zh-CN" altLang="en-US" sz="2200" dirty="0">
               <a:solidFill>
@@ -7791,7 +7803,7 @@
         </p:nvSpPr>
         <p:spPr>
           <a:xfrm>
-            <a:off x="6109018" y="4409293"/>
+            <a:off x="7041002" y="4955516"/>
             <a:ext cx="4285615" cy="698112"/>
           </a:xfrm>
           <a:prstGeom prst="round1Rect">
@@ -7830,7 +7842,7 @@
               <a:buFontTx/>
             </a:pPr>
             <a:r>
-              <a:rPr lang="zh-CN" altLang="en-US" sz="2200" dirty="0">
+              <a:rPr lang="zh-CN" altLang="en-US" sz="2200" dirty="0" smtClean="0">
                 <a:solidFill>
                   <a:schemeClr val="bg1"/>
                 </a:solidFill>
@@ -7839,8 +7851,17 @@
                 <a:cs typeface="思源黑体 CN Regular" panose="020B0500000000000000" charset="-122"/>
                 <a:sym typeface="+mn-ea"/>
               </a:rPr>
-              <a:t>群体建模、光线追踪计算冠层光分布</a:t>
-            </a:r>
+              <a:t>植物表型参数反演</a:t>
+            </a:r>
+            <a:endParaRPr lang="zh-CN" altLang="en-US" sz="2200" dirty="0">
+              <a:solidFill>
+                <a:schemeClr val="bg1"/>
+              </a:solidFill>
+              <a:latin typeface="思源黑体 CN Regular" panose="020B0500000000000000" charset="-122"/>
+              <a:ea typeface="思源黑体 CN Regular" panose="020B0500000000000000" charset="-122"/>
+              <a:cs typeface="思源黑体 CN Regular" panose="020B0500000000000000" charset="-122"/>
+              <a:sym typeface="+mn-ea"/>
+            </a:endParaRPr>
           </a:p>
         </p:txBody>
       </p:sp>
@@ -8084,13 +8105,7 @@
       </p:pic>
       <p:pic>
         <p:nvPicPr>
-          <p:cNvPr id="18" name="图片 17">
-            <a:extLst>
-              <a:ext uri="{FF2B5EF4-FFF2-40B4-BE49-F238E27FC236}">
-                <a16:creationId xmlns:a16="http://schemas.microsoft.com/office/drawing/2014/main" id="{25F11D9E-6659-8BF1-5BFF-927E3BFB6A44}"/>
-              </a:ext>
-            </a:extLst>
-          </p:cNvPr>
+          <p:cNvPr id="2" name="图片 1"/>
           <p:cNvPicPr>
             <a:picLocks noChangeAspect="1"/>
           </p:cNvPicPr>
@@ -8104,8 +8119,8 @@
         </p:blipFill>
         <p:spPr>
           <a:xfrm>
-            <a:off x="2458682" y="1170680"/>
-            <a:ext cx="6403416" cy="4684816"/>
+            <a:off x="2472837" y="1055188"/>
+            <a:ext cx="7074702" cy="5382249"/>
           </a:xfrm>
           <a:prstGeom prst="rect">
             <a:avLst/>
@@ -8181,7 +8196,7 @@
                 <a:defRPr/>
               </a:pPr>
               <a:r>
-                <a:rPr lang="zh-CN" altLang="en-US" sz="2800" dirty="0">
+                <a:rPr lang="zh-CN" altLang="en-US" sz="2800" dirty="0" smtClean="0">
                   <a:solidFill>
                     <a:schemeClr val="tx1">
                       <a:lumMod val="95000"/>
@@ -8191,8 +8206,18 @@
                   <a:latin typeface="思源宋体 CN Heavy" panose="02020900000000000000" pitchFamily="18" charset="-122"/>
                   <a:ea typeface="思源宋体 CN Heavy" panose="02020900000000000000" pitchFamily="18" charset="-122"/>
                 </a:rPr>
-                <a:t>点云数据前处理模块</a:t>
+                <a:t>高光谱的原始数据</a:t>
               </a:r>
+              <a:endParaRPr lang="zh-CN" altLang="en-US" sz="2800" dirty="0">
+                <a:solidFill>
+                  <a:schemeClr val="tx1">
+                    <a:lumMod val="95000"/>
+                    <a:lumOff val="5000"/>
+                  </a:schemeClr>
+                </a:solidFill>
+                <a:latin typeface="思源宋体 CN Heavy" panose="02020900000000000000" pitchFamily="18" charset="-122"/>
+                <a:ea typeface="思源宋体 CN Heavy" panose="02020900000000000000" pitchFamily="18" charset="-122"/>
+              </a:endParaRPr>
             </a:p>
           </p:txBody>
         </p:sp>
@@ -8323,13 +8348,7 @@
       </p:pic>
       <p:pic>
         <p:nvPicPr>
-          <p:cNvPr id="3" name="图片 2">
-            <a:extLst>
-              <a:ext uri="{FF2B5EF4-FFF2-40B4-BE49-F238E27FC236}">
-                <a16:creationId xmlns:a16="http://schemas.microsoft.com/office/drawing/2014/main" id="{E11619B0-9273-CBE7-917C-6E48AECBD3C8}"/>
-              </a:ext>
-            </a:extLst>
-          </p:cNvPr>
+          <p:cNvPr id="2" name="图片 1"/>
           <p:cNvPicPr>
             <a:picLocks noChangeAspect="1"/>
           </p:cNvPicPr>
@@ -8343,8 +8362,8 @@
         </p:blipFill>
         <p:spPr>
           <a:xfrm>
-            <a:off x="2096770" y="1075730"/>
-            <a:ext cx="6901614" cy="1233840"/>
+            <a:off x="2096770" y="3823788"/>
+            <a:ext cx="8121161" cy="2060807"/>
           </a:xfrm>
           <a:prstGeom prst="rect">
             <a:avLst/>
@@ -8353,13 +8372,7 @@
       </p:pic>
       <p:pic>
         <p:nvPicPr>
-          <p:cNvPr id="10" name="图片 9">
-            <a:extLst>
-              <a:ext uri="{FF2B5EF4-FFF2-40B4-BE49-F238E27FC236}">
-                <a16:creationId xmlns:a16="http://schemas.microsoft.com/office/drawing/2014/main" id="{BF6018A7-7313-ED56-2D82-C7FAD9B869B8}"/>
-              </a:ext>
-            </a:extLst>
-          </p:cNvPr>
+          <p:cNvPr id="5" name="图片 4"/>
           <p:cNvPicPr>
             <a:picLocks noChangeAspect="1"/>
           </p:cNvPicPr>
@@ -8373,380 +8386,14 @@
         </p:blipFill>
         <p:spPr>
           <a:xfrm>
-            <a:off x="2096770" y="2469630"/>
-            <a:ext cx="947219" cy="347313"/>
+            <a:off x="2035419" y="1106762"/>
+            <a:ext cx="5092512" cy="2608171"/>
           </a:xfrm>
           <a:prstGeom prst="rect">
             <a:avLst/>
           </a:prstGeom>
         </p:spPr>
       </p:pic>
-      <p:sp>
-        <p:nvSpPr>
-          <p:cNvPr id="11" name="文本框 10">
-            <a:extLst>
-              <a:ext uri="{FF2B5EF4-FFF2-40B4-BE49-F238E27FC236}">
-                <a16:creationId xmlns:a16="http://schemas.microsoft.com/office/drawing/2014/main" id="{82487361-952A-7160-BA5F-49BBDDEE87E4}"/>
-              </a:ext>
-            </a:extLst>
-          </p:cNvPr>
-          <p:cNvSpPr txBox="1"/>
-          <p:nvPr/>
-        </p:nvSpPr>
-        <p:spPr>
-          <a:xfrm>
-            <a:off x="3188368" y="2469630"/>
-            <a:ext cx="5702969" cy="646331"/>
-          </a:xfrm>
-          <a:prstGeom prst="rect">
-            <a:avLst/>
-          </a:prstGeom>
-          <a:noFill/>
-        </p:spPr>
-        <p:txBody>
-          <a:bodyPr wrap="square" rtlCol="0">
-            <a:spAutoFit/>
-          </a:bodyPr>
-          <a:lstStyle/>
-          <a:p>
-            <a:r>
-              <a:rPr lang="zh-CN" altLang="en-US" dirty="0"/>
-              <a:t>打开文件按钮点击后显示文件选择框选取处理文件，同时文本框中也会更新路径</a:t>
-            </a:r>
-          </a:p>
-        </p:txBody>
-      </p:sp>
-      <p:pic>
-        <p:nvPicPr>
-          <p:cNvPr id="13" name="图片 12">
-            <a:extLst>
-              <a:ext uri="{FF2B5EF4-FFF2-40B4-BE49-F238E27FC236}">
-                <a16:creationId xmlns:a16="http://schemas.microsoft.com/office/drawing/2014/main" id="{8E0ADFB4-995C-4F2F-ECE0-35F33DD84767}"/>
-              </a:ext>
-            </a:extLst>
-          </p:cNvPr>
-          <p:cNvPicPr>
-            <a:picLocks noChangeAspect="1"/>
-          </p:cNvPicPr>
-          <p:nvPr/>
-        </p:nvPicPr>
-        <p:blipFill>
-          <a:blip r:embed="rId8"/>
-          <a:stretch>
-            <a:fillRect/>
-          </a:stretch>
-        </p:blipFill>
-        <p:spPr>
-          <a:xfrm>
-            <a:off x="2096770" y="3160371"/>
-            <a:ext cx="947219" cy="348123"/>
-          </a:xfrm>
-          <a:prstGeom prst="rect">
-            <a:avLst/>
-          </a:prstGeom>
-        </p:spPr>
-      </p:pic>
-      <p:sp>
-        <p:nvSpPr>
-          <p:cNvPr id="14" name="文本框 13">
-            <a:extLst>
-              <a:ext uri="{FF2B5EF4-FFF2-40B4-BE49-F238E27FC236}">
-                <a16:creationId xmlns:a16="http://schemas.microsoft.com/office/drawing/2014/main" id="{055A8DC6-2E95-A705-F5DB-514D0DE87115}"/>
-              </a:ext>
-            </a:extLst>
-          </p:cNvPr>
-          <p:cNvSpPr txBox="1"/>
-          <p:nvPr/>
-        </p:nvSpPr>
-        <p:spPr>
-          <a:xfrm>
-            <a:off x="3188368" y="3160371"/>
-            <a:ext cx="5955210" cy="369332"/>
-          </a:xfrm>
-          <a:prstGeom prst="rect">
-            <a:avLst/>
-          </a:prstGeom>
-          <a:noFill/>
-        </p:spPr>
-        <p:txBody>
-          <a:bodyPr wrap="square" rtlCol="0">
-            <a:spAutoFit/>
-          </a:bodyPr>
-          <a:lstStyle/>
-          <a:p>
-            <a:r>
-              <a:rPr lang="zh-CN" altLang="en-US" dirty="0"/>
-              <a:t>打开文件夹为批量处理时选取多个文件所属的文件夹</a:t>
-            </a:r>
-          </a:p>
-        </p:txBody>
-      </p:sp>
-      <p:pic>
-        <p:nvPicPr>
-          <p:cNvPr id="17" name="图片 16">
-            <a:extLst>
-              <a:ext uri="{FF2B5EF4-FFF2-40B4-BE49-F238E27FC236}">
-                <a16:creationId xmlns:a16="http://schemas.microsoft.com/office/drawing/2014/main" id="{7B1E5E96-9761-6978-3034-29E6D3F1A9F0}"/>
-              </a:ext>
-            </a:extLst>
-          </p:cNvPr>
-          <p:cNvPicPr>
-            <a:picLocks noChangeAspect="1"/>
-          </p:cNvPicPr>
-          <p:nvPr/>
-        </p:nvPicPr>
-        <p:blipFill>
-          <a:blip r:embed="rId9"/>
-          <a:stretch>
-            <a:fillRect/>
-          </a:stretch>
-        </p:blipFill>
-        <p:spPr>
-          <a:xfrm>
-            <a:off x="2096770" y="3758611"/>
-            <a:ext cx="947219" cy="326916"/>
-          </a:xfrm>
-          <a:prstGeom prst="rect">
-            <a:avLst/>
-          </a:prstGeom>
-        </p:spPr>
-      </p:pic>
-      <p:sp>
-        <p:nvSpPr>
-          <p:cNvPr id="19" name="文本框 18">
-            <a:extLst>
-              <a:ext uri="{FF2B5EF4-FFF2-40B4-BE49-F238E27FC236}">
-                <a16:creationId xmlns:a16="http://schemas.microsoft.com/office/drawing/2014/main" id="{B9E0969A-1836-1EA6-DF75-73A61F562401}"/>
-              </a:ext>
-            </a:extLst>
-          </p:cNvPr>
-          <p:cNvSpPr txBox="1"/>
-          <p:nvPr/>
-        </p:nvSpPr>
-        <p:spPr>
-          <a:xfrm>
-            <a:off x="3188368" y="3758611"/>
-            <a:ext cx="5456321" cy="369332"/>
-          </a:xfrm>
-          <a:prstGeom prst="rect">
-            <a:avLst/>
-          </a:prstGeom>
-          <a:noFill/>
-        </p:spPr>
-        <p:txBody>
-          <a:bodyPr wrap="square" rtlCol="0">
-            <a:spAutoFit/>
-          </a:bodyPr>
-          <a:lstStyle/>
-          <a:p>
-            <a:r>
-              <a:rPr lang="zh-CN" altLang="en-US" dirty="0"/>
-              <a:t>单个文件处理为读取点云文件提取数据</a:t>
-            </a:r>
-          </a:p>
-        </p:txBody>
-      </p:sp>
-      <p:pic>
-        <p:nvPicPr>
-          <p:cNvPr id="21" name="图片 20">
-            <a:extLst>
-              <a:ext uri="{FF2B5EF4-FFF2-40B4-BE49-F238E27FC236}">
-                <a16:creationId xmlns:a16="http://schemas.microsoft.com/office/drawing/2014/main" id="{6C6D9ABE-F674-E5A0-0BB5-433FF0357991}"/>
-              </a:ext>
-            </a:extLst>
-          </p:cNvPr>
-          <p:cNvPicPr>
-            <a:picLocks noChangeAspect="1"/>
-          </p:cNvPicPr>
-          <p:nvPr/>
-        </p:nvPicPr>
-        <p:blipFill>
-          <a:blip r:embed="rId10"/>
-          <a:stretch>
-            <a:fillRect/>
-          </a:stretch>
-        </p:blipFill>
-        <p:spPr>
-          <a:xfrm>
-            <a:off x="2096770" y="4227470"/>
-            <a:ext cx="957227" cy="347313"/>
-          </a:xfrm>
-          <a:prstGeom prst="rect">
-            <a:avLst/>
-          </a:prstGeom>
-        </p:spPr>
-      </p:pic>
-      <p:sp>
-        <p:nvSpPr>
-          <p:cNvPr id="25" name="文本框 24">
-            <a:extLst>
-              <a:ext uri="{FF2B5EF4-FFF2-40B4-BE49-F238E27FC236}">
-                <a16:creationId xmlns:a16="http://schemas.microsoft.com/office/drawing/2014/main" id="{4BE67B6B-B738-0235-58B0-C88A2E82123B}"/>
-              </a:ext>
-            </a:extLst>
-          </p:cNvPr>
-          <p:cNvSpPr txBox="1"/>
-          <p:nvPr/>
-        </p:nvSpPr>
-        <p:spPr>
-          <a:xfrm>
-            <a:off x="3188368" y="4184939"/>
-            <a:ext cx="6878806" cy="369332"/>
-          </a:xfrm>
-          <a:prstGeom prst="rect">
-            <a:avLst/>
-          </a:prstGeom>
-          <a:noFill/>
-        </p:spPr>
-        <p:txBody>
-          <a:bodyPr wrap="none" rtlCol="0">
-            <a:spAutoFit/>
-          </a:bodyPr>
-          <a:lstStyle/>
-          <a:p>
-            <a:r>
-              <a:rPr lang="zh-CN" altLang="en-US" dirty="0"/>
-              <a:t>查看为打开文件后进行点云数据可视化，加载速度取决于点云大小</a:t>
-            </a:r>
-          </a:p>
-        </p:txBody>
-      </p:sp>
-      <p:pic>
-        <p:nvPicPr>
-          <p:cNvPr id="27" name="图片 26">
-            <a:extLst>
-              <a:ext uri="{FF2B5EF4-FFF2-40B4-BE49-F238E27FC236}">
-                <a16:creationId xmlns:a16="http://schemas.microsoft.com/office/drawing/2014/main" id="{F3EA5FF8-EA00-2CE9-B46E-BBE0174C6CD9}"/>
-              </a:ext>
-            </a:extLst>
-          </p:cNvPr>
-          <p:cNvPicPr>
-            <a:picLocks noChangeAspect="1"/>
-          </p:cNvPicPr>
-          <p:nvPr/>
-        </p:nvPicPr>
-        <p:blipFill>
-          <a:blip r:embed="rId11"/>
-          <a:stretch>
-            <a:fillRect/>
-          </a:stretch>
-        </p:blipFill>
-        <p:spPr>
-          <a:xfrm>
-            <a:off x="2092840" y="4687907"/>
-            <a:ext cx="947219" cy="321231"/>
-          </a:xfrm>
-          <a:prstGeom prst="rect">
-            <a:avLst/>
-          </a:prstGeom>
-        </p:spPr>
-      </p:pic>
-      <p:sp>
-        <p:nvSpPr>
-          <p:cNvPr id="29" name="文本框 28">
-            <a:extLst>
-              <a:ext uri="{FF2B5EF4-FFF2-40B4-BE49-F238E27FC236}">
-                <a16:creationId xmlns:a16="http://schemas.microsoft.com/office/drawing/2014/main" id="{5D771A45-B394-5BAE-1BC2-7176E9578AA2}"/>
-              </a:ext>
-            </a:extLst>
-          </p:cNvPr>
-          <p:cNvSpPr txBox="1"/>
-          <p:nvPr/>
-        </p:nvSpPr>
-        <p:spPr>
-          <a:xfrm>
-            <a:off x="3188368" y="4598513"/>
-            <a:ext cx="4339650" cy="369332"/>
-          </a:xfrm>
-          <a:prstGeom prst="rect">
-            <a:avLst/>
-          </a:prstGeom>
-          <a:noFill/>
-        </p:spPr>
-        <p:txBody>
-          <a:bodyPr wrap="none" rtlCol="0">
-            <a:spAutoFit/>
-          </a:bodyPr>
-          <a:lstStyle/>
-          <a:p>
-            <a:r>
-              <a:rPr lang="zh-CN" altLang="en-US" dirty="0"/>
-              <a:t>此按钮可以直接选取点云文件可视化浏览</a:t>
-            </a:r>
-          </a:p>
-        </p:txBody>
-      </p:sp>
-      <p:sp>
-        <p:nvSpPr>
-          <p:cNvPr id="30" name="文本框 29">
-            <a:extLst>
-              <a:ext uri="{FF2B5EF4-FFF2-40B4-BE49-F238E27FC236}">
-                <a16:creationId xmlns:a16="http://schemas.microsoft.com/office/drawing/2014/main" id="{7FCD1E88-69AD-6EBD-2958-F395F3DB51A4}"/>
-              </a:ext>
-            </a:extLst>
-          </p:cNvPr>
-          <p:cNvSpPr txBox="1"/>
-          <p:nvPr/>
-        </p:nvSpPr>
-        <p:spPr>
-          <a:xfrm>
-            <a:off x="2101980" y="5273247"/>
-            <a:ext cx="8127986" cy="646331"/>
-          </a:xfrm>
-          <a:prstGeom prst="rect">
-            <a:avLst/>
-          </a:prstGeom>
-          <a:noFill/>
-        </p:spPr>
-        <p:txBody>
-          <a:bodyPr wrap="square" rtlCol="0">
-            <a:spAutoFit/>
-          </a:bodyPr>
-          <a:lstStyle/>
-          <a:p>
-            <a:r>
-              <a:rPr lang="zh-CN" altLang="en-US" dirty="0">
-                <a:solidFill>
-                  <a:srgbClr val="FF0000"/>
-                </a:solidFill>
-              </a:rPr>
-              <a:t>注意：此模块选择处理的数据只能是点云格式，后缀为</a:t>
-            </a:r>
-            <a:r>
-              <a:rPr lang="en-US" altLang="zh-CN" dirty="0">
-                <a:solidFill>
-                  <a:srgbClr val="FF0000"/>
-                </a:solidFill>
-              </a:rPr>
-              <a:t>ply</a:t>
-            </a:r>
-            <a:r>
-              <a:rPr lang="zh-CN" altLang="en-US" dirty="0">
-                <a:solidFill>
-                  <a:srgbClr val="FF0000"/>
-                </a:solidFill>
-              </a:rPr>
-              <a:t>的文件，不支持含有三角曲面格式的</a:t>
-            </a:r>
-            <a:r>
-              <a:rPr lang="en-US" altLang="zh-CN" dirty="0">
-                <a:solidFill>
-                  <a:srgbClr val="FF0000"/>
-                </a:solidFill>
-              </a:rPr>
-              <a:t>ply</a:t>
-            </a:r>
-            <a:r>
-              <a:rPr lang="zh-CN" altLang="en-US" dirty="0">
-                <a:solidFill>
-                  <a:srgbClr val="FF0000"/>
-                </a:solidFill>
-              </a:rPr>
-              <a:t>文件，否则会导致异常。</a:t>
-            </a:r>
-          </a:p>
-        </p:txBody>
-      </p:sp>
     </p:spTree>
     <p:extLst>
       <p:ext uri="{BB962C8B-B14F-4D97-AF65-F5344CB8AC3E}">

</xml_diff>